<commit_message>
Update document to V2.
</commit_message>
<xml_diff>
--- a/document/Chat Server Design.pptx
+++ b/document/Chat Server Design.pptx
@@ -5,10 +5,10 @@
     <p:sldMasterId id="2147483648" r:id="rId1"/>
   </p:sldMasterIdLst>
   <p:notesMasterIdLst>
-    <p:notesMasterId r:id="rId15"/>
+    <p:notesMasterId r:id="rId16"/>
   </p:notesMasterIdLst>
   <p:handoutMasterIdLst>
-    <p:handoutMasterId r:id="rId16"/>
+    <p:handoutMasterId r:id="rId17"/>
   </p:handoutMasterIdLst>
   <p:sldIdLst>
     <p:sldId id="261" r:id="rId2"/>
@@ -24,6 +24,7 @@
     <p:sldId id="272" r:id="rId12"/>
     <p:sldId id="271" r:id="rId13"/>
     <p:sldId id="273" r:id="rId14"/>
+    <p:sldId id="274" r:id="rId15"/>
   </p:sldIdLst>
   <p:sldSz cx="9144000" cy="5143500" type="screen16x9"/>
   <p:notesSz cx="6858000" cy="9144000"/>
@@ -124,7 +125,7 @@
   </p:defaultTextStyle>
   <p:extLst>
     <p:ext uri="{EFAFB233-063F-42B5-8137-9DF3F51BA10A}">
-      <p15:sldGuideLst xmlns:p15="http://schemas.microsoft.com/office/powerpoint/2012/main" xmlns="">
+      <p15:sldGuideLst xmlns:p15="http://schemas.microsoft.com/office/powerpoint/2012/main">
         <p15:guide id="1" orient="horz" pos="1620">
           <p15:clr>
             <a:srgbClr val="A4A3A4"/>
@@ -178,7 +179,7 @@
       </p15:sldGuideLst>
     </p:ext>
     <p:ext uri="{2D200454-40CA-4A62-9FC3-DE9A4176ACB9}">
-      <p15:notesGuideLst xmlns:p15="http://schemas.microsoft.com/office/powerpoint/2012/main" xmlns="">
+      <p15:notesGuideLst xmlns:p15="http://schemas.microsoft.com/office/powerpoint/2012/main">
         <p15:guide id="1" orient="horz" pos="2880">
           <p15:clr>
             <a:srgbClr val="A4A3A4"/>
@@ -266,7 +267,7 @@
           <a:blip r:embed="rId2" cstate="print">
             <a:extLst>
               <a:ext uri="{BEBA8EAE-BF5A-486C-A8C5-ECC9F3942E4B}">
-                <a14:imgProps xmlns:a14="http://schemas.microsoft.com/office/drawing/2010/main" xmlns="">
+                <a14:imgProps xmlns:a14="http://schemas.microsoft.com/office/drawing/2010/main">
                   <a14:imgLayer r:embed="rId3">
                     <a14:imgEffect>
                       <a14:brightnessContrast bright="-100000"/>
@@ -275,7 +276,7 @@
                 </a14:imgProps>
               </a:ext>
               <a:ext uri="{28A0092B-C50C-407E-A947-70E740481C1C}">
-                <a14:useLocalDpi xmlns:a14="http://schemas.microsoft.com/office/drawing/2010/main" xmlns=""/>
+                <a14:useLocalDpi xmlns:a14="http://schemas.microsoft.com/office/drawing/2010/main"/>
               </a:ext>
             </a:extLst>
           </a:blip>
@@ -304,7 +305,7 @@
     </p:spTree>
     <p:extLst>
       <p:ext uri="{BB962C8B-B14F-4D97-AF65-F5344CB8AC3E}">
-        <p14:creationId xmlns:p14="http://schemas.microsoft.com/office/powerpoint/2010/main" xmlns="" val="405406066"/>
+        <p14:creationId xmlns:p14="http://schemas.microsoft.com/office/powerpoint/2010/main" val="405406066"/>
       </p:ext>
     </p:extLst>
   </p:cSld>
@@ -468,7 +469,7 @@
     </p:spTree>
     <p:extLst>
       <p:ext uri="{BB962C8B-B14F-4D97-AF65-F5344CB8AC3E}">
-        <p14:creationId xmlns:p14="http://schemas.microsoft.com/office/powerpoint/2010/main" xmlns="" val="3833641228"/>
+        <p14:creationId xmlns:p14="http://schemas.microsoft.com/office/powerpoint/2010/main" val="3833641228"/>
       </p:ext>
     </p:extLst>
   </p:cSld>
@@ -643,7 +644,7 @@
     </p:spTree>
     <p:extLst>
       <p:ext uri="{BB962C8B-B14F-4D97-AF65-F5344CB8AC3E}">
-        <p14:creationId xmlns:p14="http://schemas.microsoft.com/office/powerpoint/2010/main" xmlns="" val="3087602786"/>
+        <p14:creationId xmlns:p14="http://schemas.microsoft.com/office/powerpoint/2010/main" val="3087602786"/>
       </p:ext>
     </p:extLst>
   </p:cSld>
@@ -879,7 +880,7 @@
   </p:timing>
   <p:extLst mod="1">
     <p:ext uri="{DCECCB84-F9BA-43D5-87BE-67443E8EF086}">
-      <p15:sldGuideLst xmlns:p15="http://schemas.microsoft.com/office/powerpoint/2012/main" xmlns=""/>
+      <p15:sldGuideLst xmlns:p15="http://schemas.microsoft.com/office/powerpoint/2012/main"/>
     </p:ext>
   </p:extLst>
 </p:sldLayout>
@@ -1119,7 +1120,7 @@
   </p:timing>
   <p:extLst mod="1">
     <p:ext uri="{DCECCB84-F9BA-43D5-87BE-67443E8EF086}">
-      <p15:sldGuideLst xmlns:p15="http://schemas.microsoft.com/office/powerpoint/2012/main" xmlns=""/>
+      <p15:sldGuideLst xmlns:p15="http://schemas.microsoft.com/office/powerpoint/2012/main"/>
     </p:ext>
   </p:extLst>
 </p:sldLayout>
@@ -1357,7 +1358,7 @@
             <a:lum bright="-100000"/>
             <a:extLst>
               <a:ext uri="{28A0092B-C50C-407E-A947-70E740481C1C}">
-                <a14:useLocalDpi xmlns:a14="http://schemas.microsoft.com/office/drawing/2010/main" xmlns=""/>
+                <a14:useLocalDpi xmlns:a14="http://schemas.microsoft.com/office/drawing/2010/main"/>
               </a:ext>
             </a:extLst>
           </a:blip>
@@ -1623,7 +1624,7 @@
           <a:blip r:embed="rId2" cstate="print">
             <a:extLst>
               <a:ext uri="{28A0092B-C50C-407E-A947-70E740481C1C}">
-                <a14:useLocalDpi xmlns:a14="http://schemas.microsoft.com/office/drawing/2010/main" xmlns=""/>
+                <a14:useLocalDpi xmlns:a14="http://schemas.microsoft.com/office/drawing/2010/main"/>
               </a:ext>
             </a:extLst>
           </a:blip>
@@ -1882,7 +1883,7 @@
           <a:blip r:embed="rId2" cstate="print">
             <a:extLst>
               <a:ext uri="{28A0092B-C50C-407E-A947-70E740481C1C}">
-                <a14:useLocalDpi xmlns:a14="http://schemas.microsoft.com/office/drawing/2010/main" xmlns=""/>
+                <a14:useLocalDpi xmlns:a14="http://schemas.microsoft.com/office/drawing/2010/main"/>
               </a:ext>
             </a:extLst>
           </a:blip>
@@ -2155,7 +2156,7 @@
             <a:lum bright="-100000"/>
             <a:extLst>
               <a:ext uri="{28A0092B-C50C-407E-A947-70E740481C1C}">
-                <a14:useLocalDpi xmlns:a14="http://schemas.microsoft.com/office/drawing/2010/main" xmlns=""/>
+                <a14:useLocalDpi xmlns:a14="http://schemas.microsoft.com/office/drawing/2010/main"/>
               </a:ext>
             </a:extLst>
           </a:blip>
@@ -2366,7 +2367,7 @@
           <a:blip r:embed="rId2" cstate="print">
             <a:extLst>
               <a:ext uri="{28A0092B-C50C-407E-A947-70E740481C1C}">
-                <a14:useLocalDpi xmlns:a14="http://schemas.microsoft.com/office/drawing/2010/main" xmlns=""/>
+                <a14:useLocalDpi xmlns:a14="http://schemas.microsoft.com/office/drawing/2010/main"/>
               </a:ext>
             </a:extLst>
           </a:blip>
@@ -2398,7 +2399,7 @@
   </p:timing>
   <p:extLst mod="1">
     <p:ext uri="{DCECCB84-F9BA-43D5-87BE-67443E8EF086}">
-      <p15:sldGuideLst xmlns:p15="http://schemas.microsoft.com/office/powerpoint/2012/main" xmlns=""/>
+      <p15:sldGuideLst xmlns:p15="http://schemas.microsoft.com/office/powerpoint/2012/main"/>
     </p:ext>
   </p:extLst>
 </p:sldLayout>
@@ -3135,7 +3136,7 @@
   </p:txStyles>
   <p:extLst mod="1">
     <p:ext uri="{27BBF7A9-308A-43DC-89C8-2F10F3537804}">
-      <p15:sldGuideLst xmlns:p15="http://schemas.microsoft.com/office/powerpoint/2012/main" xmlns="">
+      <p15:sldGuideLst xmlns:p15="http://schemas.microsoft.com/office/powerpoint/2012/main">
         <p15:guide id="1" orient="horz" pos="1620" userDrawn="1">
           <p15:clr>
             <a:srgbClr val="9FCC3B"/>
@@ -3241,55 +3242,6 @@
           </a:p>
         </p:txBody>
       </p:sp>
-      <p:sp>
-        <p:nvSpPr>
-          <p:cNvPr id="4" name="Text Placeholder 3"/>
-          <p:cNvSpPr>
-            <a:spLocks noGrp="1"/>
-          </p:cNvSpPr>
-          <p:nvPr>
-            <p:ph type="body" sz="quarter" idx="13"/>
-          </p:nvPr>
-        </p:nvSpPr>
-        <p:spPr/>
-        <p:txBody>
-          <a:bodyPr/>
-          <a:lstStyle/>
-          <a:p>
-            <a:endParaRPr lang="en-US"/>
-          </a:p>
-        </p:txBody>
-      </p:sp>
-      <p:sp>
-        <p:nvSpPr>
-          <p:cNvPr id="5" name="Text Placeholder 4"/>
-          <p:cNvSpPr>
-            <a:spLocks noGrp="1"/>
-          </p:cNvSpPr>
-          <p:nvPr>
-            <p:ph type="body" sz="quarter" idx="4294967295"/>
-          </p:nvPr>
-        </p:nvSpPr>
-        <p:spPr>
-          <a:xfrm>
-            <a:off x="-648240" y="4320000"/>
-            <a:ext cx="7826400" cy="349200"/>
-          </a:xfrm>
-        </p:spPr>
-        <p:txBody>
-          <a:bodyPr>
-            <a:normAutofit fontScale="25000" lnSpcReduction="20000"/>
-          </a:bodyPr>
-          <a:lstStyle/>
-          <a:p>
-            <a:r>
-              <a:rPr lang="en-US" altLang="ja-JP" dirty="0" smtClean="0"/>
-              <a:t>© Sony Mobile Communications</a:t>
-            </a:r>
-            <a:endParaRPr lang="en-US" dirty="0"/>
-          </a:p>
-        </p:txBody>
-      </p:sp>
     </p:spTree>
   </p:cSld>
   <p:clrMapOvr>
@@ -3339,11 +3291,7 @@
           <a:p>
             <a:r>
               <a:rPr lang="en-US" dirty="0" smtClean="0"/>
-              <a:t>Server Node </a:t>
-            </a:r>
-            <a:r>
-              <a:rPr lang="en-US" dirty="0" smtClean="0"/>
-              <a:t>Connector</a:t>
+              <a:t>Server Node Connector</a:t>
             </a:r>
             <a:endParaRPr lang="en-US" dirty="0"/>
           </a:p>
@@ -3461,11 +3409,7 @@
           <a:p>
             <a:r>
               <a:rPr lang="en-US" dirty="0" smtClean="0"/>
-              <a:t>Server Node </a:t>
-            </a:r>
-            <a:r>
-              <a:rPr lang="en-US" dirty="0" smtClean="0"/>
-              <a:t>Service Lopper</a:t>
+              <a:t>Server Node Service Lopper</a:t>
             </a:r>
             <a:endParaRPr lang="en-US" dirty="0"/>
           </a:p>
@@ -3703,37 +3647,1016 @@
       </p:sp>
       <p:pic>
         <p:nvPicPr>
-          <p:cNvPr id="7170" name="Picture 2"/>
+          <p:cNvPr id="3" name="图片 2"/>
           <p:cNvPicPr>
-            <a:picLocks noChangeAspect="1" noChangeArrowheads="1"/>
+            <a:picLocks noChangeAspect="1"/>
           </p:cNvPicPr>
           <p:nvPr/>
         </p:nvPicPr>
         <p:blipFill>
-          <a:blip r:embed="rId2" cstate="print"/>
-          <a:srcRect/>
+          <a:blip r:embed="rId2"/>
           <a:stretch>
             <a:fillRect/>
           </a:stretch>
         </p:blipFill>
-        <p:spPr bwMode="auto">
+        <p:spPr>
           <a:xfrm>
-            <a:off x="514349" y="954089"/>
-            <a:ext cx="8305801" cy="3808411"/>
+            <a:off x="419100" y="725489"/>
+            <a:ext cx="8496300" cy="3865561"/>
           </a:xfrm>
           <a:prstGeom prst="rect">
             <a:avLst/>
           </a:prstGeom>
-          <a:noFill/>
-          <a:ln w="9525">
-            <a:noFill/>
-            <a:miter lim="800000"/>
-            <a:headEnd/>
-            <a:tailEnd/>
-          </a:ln>
         </p:spPr>
       </p:pic>
     </p:spTree>
+  </p:cSld>
+  <p:clrMapOvr>
+    <a:masterClrMapping/>
+  </p:clrMapOvr>
+</p:sld>
+</file>
+
+<file path=ppt/slides/slide14.xml><?xml version="1.0" encoding="utf-8"?>
+<p:sld xmlns:a="http://schemas.openxmlformats.org/drawingml/2006/main" xmlns:r="http://schemas.openxmlformats.org/officeDocument/2006/relationships" xmlns:p="http://schemas.openxmlformats.org/presentationml/2006/main">
+  <p:cSld>
+    <p:spTree>
+      <p:nvGrpSpPr>
+        <p:cNvPr id="1" name=""/>
+        <p:cNvGrpSpPr/>
+        <p:nvPr/>
+      </p:nvGrpSpPr>
+      <p:grpSpPr>
+        <a:xfrm>
+          <a:off x="0" y="0"/>
+          <a:ext cx="0" cy="0"/>
+          <a:chOff x="0" y="0"/>
+          <a:chExt cx="0" cy="0"/>
+        </a:xfrm>
+      </p:grpSpPr>
+      <p:sp>
+        <p:nvSpPr>
+          <p:cNvPr id="2" name="标题 1"/>
+          <p:cNvSpPr>
+            <a:spLocks noGrp="1"/>
+          </p:cNvSpPr>
+          <p:nvPr>
+            <p:ph type="title"/>
+          </p:nvPr>
+        </p:nvSpPr>
+        <p:spPr/>
+        <p:txBody>
+          <a:bodyPr/>
+          <a:lstStyle/>
+          <a:p>
+            <a:r>
+              <a:rPr lang="en-US" altLang="zh-CN" dirty="0" smtClean="0"/>
+              <a:t>Server Node Service Stack</a:t>
+            </a:r>
+            <a:endParaRPr lang="zh-CN" altLang="en-US" dirty="0"/>
+          </a:p>
+        </p:txBody>
+      </p:sp>
+      <p:sp>
+        <p:nvSpPr>
+          <p:cNvPr id="4" name="矩形 3"/>
+          <p:cNvSpPr/>
+          <p:nvPr/>
+        </p:nvSpPr>
+        <p:spPr bwMode="invGray">
+          <a:xfrm>
+            <a:off x="558412" y="2071737"/>
+            <a:ext cx="2959585" cy="388079"/>
+          </a:xfrm>
+          <a:prstGeom prst="rect">
+            <a:avLst/>
+          </a:prstGeom>
+          <a:solidFill>
+            <a:schemeClr val="accent1"/>
+          </a:solidFill>
+          <a:ln w="25400">
+            <a:solidFill>
+              <a:schemeClr val="accent1">
+                <a:lumMod val="50000"/>
+              </a:schemeClr>
+            </a:solidFill>
+            <a:tailEnd type="none"/>
+          </a:ln>
+          <a:effectLst>
+            <a:outerShdw blurRad="50800" dist="50800" dir="2700000" algn="tl" rotWithShape="0">
+              <a:prstClr val="black">
+                <a:alpha val="40000"/>
+              </a:prstClr>
+            </a:outerShdw>
+          </a:effectLst>
+          <a:scene3d>
+            <a:camera prst="perspectiveRelaxed" fov="0">
+              <a:rot lat="0" lon="0" rev="0"/>
+            </a:camera>
+            <a:lightRig rig="threePt" dir="t"/>
+          </a:scene3d>
+          <a:sp3d extrusionH="177800"/>
+        </p:spPr>
+        <p:style>
+          <a:lnRef idx="1">
+            <a:schemeClr val="accent1"/>
+          </a:lnRef>
+          <a:fillRef idx="0">
+            <a:schemeClr val="accent1"/>
+          </a:fillRef>
+          <a:effectRef idx="0">
+            <a:schemeClr val="accent1"/>
+          </a:effectRef>
+          <a:fontRef idx="minor">
+            <a:schemeClr val="tx1"/>
+          </a:fontRef>
+        </p:style>
+        <p:txBody>
+          <a:bodyPr rtlCol="0" anchor="ctr">
+            <a:normAutofit fontScale="85000" lnSpcReduction="10000"/>
+          </a:bodyPr>
+          <a:lstStyle/>
+          <a:p>
+            <a:pPr algn="ctr"/>
+            <a:r>
+              <a:rPr lang="en-US" altLang="zh-CN" sz="2400" dirty="0" err="1" smtClean="0">
+                <a:latin typeface="HelveticaNeueLT Pro 55 Roman" pitchFamily="34" charset="0"/>
+              </a:rPr>
+              <a:t>MessageParseService</a:t>
+            </a:r>
+            <a:endParaRPr lang="zh-CN" altLang="en-US" sz="2400" dirty="0" smtClean="0">
+              <a:latin typeface="HelveticaNeueLT Pro 55 Roman" pitchFamily="34" charset="0"/>
+            </a:endParaRPr>
+          </a:p>
+        </p:txBody>
+      </p:sp>
+      <p:sp>
+        <p:nvSpPr>
+          <p:cNvPr id="5" name="矩形 4"/>
+          <p:cNvSpPr/>
+          <p:nvPr/>
+        </p:nvSpPr>
+        <p:spPr bwMode="invGray">
+          <a:xfrm>
+            <a:off x="558412" y="2952846"/>
+            <a:ext cx="2959585" cy="388079"/>
+          </a:xfrm>
+          <a:prstGeom prst="rect">
+            <a:avLst/>
+          </a:prstGeom>
+          <a:solidFill>
+            <a:schemeClr val="accent1"/>
+          </a:solidFill>
+          <a:ln w="25400">
+            <a:solidFill>
+              <a:schemeClr val="accent1">
+                <a:lumMod val="50000"/>
+              </a:schemeClr>
+            </a:solidFill>
+            <a:tailEnd type="none"/>
+          </a:ln>
+          <a:effectLst>
+            <a:outerShdw blurRad="50800" dist="50800" dir="2700000" algn="tl" rotWithShape="0">
+              <a:prstClr val="black">
+                <a:alpha val="40000"/>
+              </a:prstClr>
+            </a:outerShdw>
+          </a:effectLst>
+          <a:scene3d>
+            <a:camera prst="perspectiveRelaxed" fov="0">
+              <a:rot lat="0" lon="0" rev="0"/>
+            </a:camera>
+            <a:lightRig rig="threePt" dir="t"/>
+          </a:scene3d>
+          <a:sp3d extrusionH="177800"/>
+        </p:spPr>
+        <p:style>
+          <a:lnRef idx="1">
+            <a:schemeClr val="accent1"/>
+          </a:lnRef>
+          <a:fillRef idx="0">
+            <a:schemeClr val="accent1"/>
+          </a:fillRef>
+          <a:effectRef idx="0">
+            <a:schemeClr val="accent1"/>
+          </a:effectRef>
+          <a:fontRef idx="minor">
+            <a:schemeClr val="tx1"/>
+          </a:fontRef>
+        </p:style>
+        <p:txBody>
+          <a:bodyPr rtlCol="0" anchor="ctr">
+            <a:normAutofit fontScale="92500" lnSpcReduction="20000"/>
+          </a:bodyPr>
+          <a:lstStyle/>
+          <a:p>
+            <a:pPr algn="ctr"/>
+            <a:r>
+              <a:rPr lang="en-US" altLang="zh-CN" sz="2400" dirty="0" err="1" smtClean="0">
+                <a:latin typeface="HelveticaNeueLT Pro 55 Roman" pitchFamily="34" charset="0"/>
+              </a:rPr>
+              <a:t>OutputService</a:t>
+            </a:r>
+            <a:endParaRPr lang="zh-CN" altLang="en-US" sz="2400" dirty="0" smtClean="0">
+              <a:latin typeface="HelveticaNeueLT Pro 55 Roman" pitchFamily="34" charset="0"/>
+            </a:endParaRPr>
+          </a:p>
+        </p:txBody>
+      </p:sp>
+      <p:sp>
+        <p:nvSpPr>
+          <p:cNvPr id="6" name="矩形 5"/>
+          <p:cNvSpPr/>
+          <p:nvPr/>
+        </p:nvSpPr>
+        <p:spPr bwMode="invGray">
+          <a:xfrm>
+            <a:off x="558411" y="3935885"/>
+            <a:ext cx="2959585" cy="388079"/>
+          </a:xfrm>
+          <a:prstGeom prst="rect">
+            <a:avLst/>
+          </a:prstGeom>
+          <a:solidFill>
+            <a:schemeClr val="accent1"/>
+          </a:solidFill>
+          <a:ln w="25400">
+            <a:solidFill>
+              <a:schemeClr val="accent1">
+                <a:lumMod val="50000"/>
+              </a:schemeClr>
+            </a:solidFill>
+            <a:tailEnd type="none"/>
+          </a:ln>
+          <a:effectLst>
+            <a:outerShdw blurRad="50800" dist="50800" dir="2700000" algn="tl" rotWithShape="0">
+              <a:prstClr val="black">
+                <a:alpha val="40000"/>
+              </a:prstClr>
+            </a:outerShdw>
+          </a:effectLst>
+          <a:scene3d>
+            <a:camera prst="perspectiveRelaxed" fov="0">
+              <a:rot lat="0" lon="0" rev="0"/>
+            </a:camera>
+            <a:lightRig rig="threePt" dir="t"/>
+          </a:scene3d>
+          <a:sp3d extrusionH="177800"/>
+        </p:spPr>
+        <p:style>
+          <a:lnRef idx="1">
+            <a:schemeClr val="accent1"/>
+          </a:lnRef>
+          <a:fillRef idx="0">
+            <a:schemeClr val="accent1"/>
+          </a:fillRef>
+          <a:effectRef idx="0">
+            <a:schemeClr val="accent1"/>
+          </a:effectRef>
+          <a:fontRef idx="minor">
+            <a:schemeClr val="tx1"/>
+          </a:fontRef>
+        </p:style>
+        <p:txBody>
+          <a:bodyPr rtlCol="0" anchor="ctr">
+            <a:normAutofit fontScale="92500" lnSpcReduction="20000"/>
+          </a:bodyPr>
+          <a:lstStyle/>
+          <a:p>
+            <a:pPr algn="ctr"/>
+            <a:r>
+              <a:rPr lang="en-US" altLang="zh-CN" sz="2400" dirty="0" err="1" smtClean="0">
+                <a:latin typeface="HelveticaNeueLT Pro 55 Roman" pitchFamily="34" charset="0"/>
+              </a:rPr>
+              <a:t>SyncService</a:t>
+            </a:r>
+            <a:endParaRPr lang="zh-CN" altLang="en-US" sz="2400" dirty="0" smtClean="0">
+              <a:latin typeface="HelveticaNeueLT Pro 55 Roman" pitchFamily="34" charset="0"/>
+            </a:endParaRPr>
+          </a:p>
+        </p:txBody>
+      </p:sp>
+      <p:cxnSp>
+        <p:nvCxnSpPr>
+          <p:cNvPr id="8" name="直接箭头连接符 7"/>
+          <p:cNvCxnSpPr/>
+          <p:nvPr/>
+        </p:nvCxnSpPr>
+        <p:spPr>
+          <a:xfrm>
+            <a:off x="2038206" y="573089"/>
+            <a:ext cx="0" cy="649978"/>
+          </a:xfrm>
+          <a:prstGeom prst="straightConnector1">
+            <a:avLst/>
+          </a:prstGeom>
+          <a:ln w="25400">
+            <a:solidFill>
+              <a:schemeClr val="tx2"/>
+            </a:solidFill>
+            <a:tailEnd type="triangle"/>
+          </a:ln>
+        </p:spPr>
+        <p:style>
+          <a:lnRef idx="1">
+            <a:schemeClr val="accent1"/>
+          </a:lnRef>
+          <a:fillRef idx="0">
+            <a:schemeClr val="accent1"/>
+          </a:fillRef>
+          <a:effectRef idx="0">
+            <a:schemeClr val="accent1"/>
+          </a:effectRef>
+          <a:fontRef idx="minor">
+            <a:schemeClr val="tx1"/>
+          </a:fontRef>
+        </p:style>
+      </p:cxnSp>
+      <p:sp>
+        <p:nvSpPr>
+          <p:cNvPr id="10" name="矩形 9"/>
+          <p:cNvSpPr/>
+          <p:nvPr/>
+        </p:nvSpPr>
+        <p:spPr bwMode="invGray">
+          <a:xfrm>
+            <a:off x="1546105" y="777274"/>
+            <a:ext cx="984202" cy="205737"/>
+          </a:xfrm>
+          <a:prstGeom prst="rect">
+            <a:avLst/>
+          </a:prstGeom>
+          <a:solidFill>
+            <a:schemeClr val="accent1"/>
+          </a:solidFill>
+          <a:ln w="25400">
+            <a:solidFill>
+              <a:schemeClr val="accent1">
+                <a:lumMod val="50000"/>
+              </a:schemeClr>
+            </a:solidFill>
+            <a:tailEnd type="none"/>
+          </a:ln>
+          <a:effectLst>
+            <a:outerShdw blurRad="50800" dist="50800" dir="2700000" algn="tl" rotWithShape="0">
+              <a:prstClr val="black">
+                <a:alpha val="40000"/>
+              </a:prstClr>
+            </a:outerShdw>
+          </a:effectLst>
+          <a:scene3d>
+            <a:camera prst="perspectiveRelaxed" fov="0">
+              <a:rot lat="0" lon="0" rev="0"/>
+            </a:camera>
+            <a:lightRig rig="threePt" dir="t"/>
+          </a:scene3d>
+          <a:sp3d extrusionH="177800"/>
+        </p:spPr>
+        <p:style>
+          <a:lnRef idx="1">
+            <a:schemeClr val="accent1"/>
+          </a:lnRef>
+          <a:fillRef idx="0">
+            <a:schemeClr val="accent1"/>
+          </a:fillRef>
+          <a:effectRef idx="0">
+            <a:schemeClr val="accent1"/>
+          </a:effectRef>
+          <a:fontRef idx="minor">
+            <a:schemeClr val="tx1"/>
+          </a:fontRef>
+        </p:style>
+        <p:txBody>
+          <a:bodyPr rtlCol="0" anchor="ctr">
+            <a:normAutofit fontScale="32500" lnSpcReduction="20000"/>
+          </a:bodyPr>
+          <a:lstStyle/>
+          <a:p>
+            <a:pPr algn="ctr"/>
+            <a:r>
+              <a:rPr lang="en-US" altLang="zh-CN" sz="2400" dirty="0" smtClean="0">
+                <a:latin typeface="HelveticaNeueLT Pro 55 Roman" pitchFamily="34" charset="0"/>
+              </a:rPr>
+              <a:t>Data</a:t>
+            </a:r>
+            <a:endParaRPr lang="zh-CN" altLang="en-US" sz="2400" dirty="0" smtClean="0">
+              <a:latin typeface="HelveticaNeueLT Pro 55 Roman" pitchFamily="34" charset="0"/>
+            </a:endParaRPr>
+          </a:p>
+        </p:txBody>
+      </p:sp>
+      <p:cxnSp>
+        <p:nvCxnSpPr>
+          <p:cNvPr id="12" name="直接箭头连接符 11"/>
+          <p:cNvCxnSpPr>
+            <a:stCxn id="4" idx="2"/>
+            <a:endCxn id="5" idx="0"/>
+          </p:cNvCxnSpPr>
+          <p:nvPr/>
+        </p:nvCxnSpPr>
+        <p:spPr>
+          <a:xfrm>
+            <a:off x="2038205" y="2435165"/>
+            <a:ext cx="0" cy="542333"/>
+          </a:xfrm>
+          <a:prstGeom prst="straightConnector1">
+            <a:avLst/>
+          </a:prstGeom>
+          <a:ln w="25400">
+            <a:solidFill>
+              <a:schemeClr val="tx2"/>
+            </a:solidFill>
+            <a:tailEnd type="triangle"/>
+          </a:ln>
+        </p:spPr>
+        <p:style>
+          <a:lnRef idx="1">
+            <a:schemeClr val="accent1"/>
+          </a:lnRef>
+          <a:fillRef idx="0">
+            <a:schemeClr val="accent1"/>
+          </a:fillRef>
+          <a:effectRef idx="0">
+            <a:schemeClr val="accent1"/>
+          </a:effectRef>
+          <a:fontRef idx="minor">
+            <a:schemeClr val="tx1"/>
+          </a:fontRef>
+        </p:style>
+      </p:cxnSp>
+      <p:cxnSp>
+        <p:nvCxnSpPr>
+          <p:cNvPr id="14" name="直接箭头连接符 13"/>
+          <p:cNvCxnSpPr>
+            <a:endCxn id="6" idx="0"/>
+          </p:cNvCxnSpPr>
+          <p:nvPr/>
+        </p:nvCxnSpPr>
+        <p:spPr>
+          <a:xfrm flipH="1">
+            <a:off x="2038204" y="3466370"/>
+            <a:ext cx="2" cy="491873"/>
+          </a:xfrm>
+          <a:prstGeom prst="straightConnector1">
+            <a:avLst/>
+          </a:prstGeom>
+          <a:ln w="25400">
+            <a:solidFill>
+              <a:schemeClr val="tx2"/>
+            </a:solidFill>
+            <a:tailEnd type="triangle"/>
+          </a:ln>
+        </p:spPr>
+        <p:style>
+          <a:lnRef idx="1">
+            <a:schemeClr val="accent1"/>
+          </a:lnRef>
+          <a:fillRef idx="0">
+            <a:schemeClr val="accent1"/>
+          </a:fillRef>
+          <a:effectRef idx="0">
+            <a:schemeClr val="accent1"/>
+          </a:effectRef>
+          <a:fontRef idx="minor">
+            <a:schemeClr val="tx1"/>
+          </a:fontRef>
+        </p:style>
+      </p:cxnSp>
+      <p:sp>
+        <p:nvSpPr>
+          <p:cNvPr id="16" name="圆角矩形 15"/>
+          <p:cNvSpPr/>
+          <p:nvPr/>
+        </p:nvSpPr>
+        <p:spPr bwMode="invGray">
+          <a:xfrm>
+            <a:off x="5174828" y="2038688"/>
+            <a:ext cx="1854186" cy="572838"/>
+          </a:xfrm>
+          <a:prstGeom prst="roundRect">
+            <a:avLst/>
+          </a:prstGeom>
+          <a:ln>
+            <a:tailEnd type="none"/>
+          </a:ln>
+        </p:spPr>
+        <p:style>
+          <a:lnRef idx="2">
+            <a:schemeClr val="dk1"/>
+          </a:lnRef>
+          <a:fillRef idx="1">
+            <a:schemeClr val="lt1"/>
+          </a:fillRef>
+          <a:effectRef idx="0">
+            <a:schemeClr val="dk1"/>
+          </a:effectRef>
+          <a:fontRef idx="minor">
+            <a:schemeClr val="dk1"/>
+          </a:fontRef>
+        </p:style>
+        <p:txBody>
+          <a:bodyPr rtlCol="0" anchor="ctr">
+            <a:normAutofit fontScale="47500" lnSpcReduction="20000"/>
+          </a:bodyPr>
+          <a:lstStyle/>
+          <a:p>
+            <a:pPr algn="ctr"/>
+            <a:r>
+              <a:rPr lang="en-US" altLang="zh-CN" sz="2400" dirty="0" err="1" smtClean="0">
+                <a:latin typeface="HelveticaNeueLT Pro 55 Roman" pitchFamily="34" charset="0"/>
+              </a:rPr>
+              <a:t>MessageParserService</a:t>
+            </a:r>
+            <a:r>
+              <a:rPr lang="en-US" altLang="zh-CN" sz="2400" dirty="0" smtClean="0">
+                <a:latin typeface="HelveticaNeueLT Pro 55 Roman" pitchFamily="34" charset="0"/>
+              </a:rPr>
+              <a:t>: format origin data stream to Message Object</a:t>
+            </a:r>
+            <a:endParaRPr lang="zh-CN" altLang="en-US" sz="2400" dirty="0" smtClean="0">
+              <a:latin typeface="HelveticaNeueLT Pro 55 Roman" pitchFamily="34" charset="0"/>
+            </a:endParaRPr>
+          </a:p>
+        </p:txBody>
+      </p:sp>
+      <p:cxnSp>
+        <p:nvCxnSpPr>
+          <p:cNvPr id="18" name="直接箭头连接符 17"/>
+          <p:cNvCxnSpPr>
+            <a:stCxn id="16" idx="1"/>
+            <a:endCxn id="4" idx="3"/>
+          </p:cNvCxnSpPr>
+          <p:nvPr/>
+        </p:nvCxnSpPr>
+        <p:spPr>
+          <a:xfrm flipH="1" flipV="1">
+            <a:off x="3517997" y="2262811"/>
+            <a:ext cx="1656831" cy="65263"/>
+          </a:xfrm>
+          <a:prstGeom prst="straightConnector1">
+            <a:avLst/>
+          </a:prstGeom>
+          <a:ln w="25400">
+            <a:solidFill>
+              <a:schemeClr val="tx2"/>
+            </a:solidFill>
+            <a:tailEnd type="triangle"/>
+          </a:ln>
+        </p:spPr>
+        <p:style>
+          <a:lnRef idx="1">
+            <a:schemeClr val="accent1"/>
+          </a:lnRef>
+          <a:fillRef idx="0">
+            <a:schemeClr val="accent1"/>
+          </a:fillRef>
+          <a:effectRef idx="0">
+            <a:schemeClr val="accent1"/>
+          </a:effectRef>
+          <a:fontRef idx="minor">
+            <a:schemeClr val="tx1"/>
+          </a:fontRef>
+        </p:style>
+      </p:cxnSp>
+      <p:sp>
+        <p:nvSpPr>
+          <p:cNvPr id="19" name="圆角矩形 18"/>
+          <p:cNvSpPr/>
+          <p:nvPr/>
+        </p:nvSpPr>
+        <p:spPr bwMode="invGray">
+          <a:xfrm>
+            <a:off x="4997790" y="3055056"/>
+            <a:ext cx="2108005" cy="576872"/>
+          </a:xfrm>
+          <a:prstGeom prst="roundRect">
+            <a:avLst/>
+          </a:prstGeom>
+          <a:ln>
+            <a:tailEnd type="none"/>
+          </a:ln>
+        </p:spPr>
+        <p:style>
+          <a:lnRef idx="2">
+            <a:schemeClr val="dk1"/>
+          </a:lnRef>
+          <a:fillRef idx="1">
+            <a:schemeClr val="lt1"/>
+          </a:fillRef>
+          <a:effectRef idx="0">
+            <a:schemeClr val="dk1"/>
+          </a:effectRef>
+          <a:fontRef idx="minor">
+            <a:schemeClr val="dk1"/>
+          </a:fontRef>
+        </p:style>
+        <p:txBody>
+          <a:bodyPr rtlCol="0" anchor="ctr">
+            <a:normAutofit fontScale="47500" lnSpcReduction="20000"/>
+          </a:bodyPr>
+          <a:lstStyle/>
+          <a:p>
+            <a:pPr algn="ctr"/>
+            <a:r>
+              <a:rPr lang="en-US" altLang="zh-CN" sz="2400" dirty="0" err="1" smtClean="0">
+                <a:latin typeface="HelveticaNeueLT Pro 55 Roman" pitchFamily="34" charset="0"/>
+              </a:rPr>
+              <a:t>OutputService</a:t>
+            </a:r>
+            <a:r>
+              <a:rPr lang="en-US" altLang="zh-CN" sz="2400" dirty="0" smtClean="0">
+                <a:latin typeface="HelveticaNeueLT Pro 55 Roman" pitchFamily="34" charset="0"/>
+              </a:rPr>
+              <a:t> : </a:t>
+            </a:r>
+            <a:br>
+              <a:rPr lang="en-US" altLang="zh-CN" sz="2400" dirty="0" smtClean="0">
+                <a:latin typeface="HelveticaNeueLT Pro 55 Roman" pitchFamily="34" charset="0"/>
+              </a:rPr>
+            </a:br>
+            <a:r>
+              <a:rPr lang="en-US" altLang="zh-CN" sz="2400" dirty="0" smtClean="0">
+                <a:latin typeface="HelveticaNeueLT Pro 55 Roman" pitchFamily="34" charset="0"/>
+              </a:rPr>
+              <a:t>Handle services which can output to local user</a:t>
+            </a:r>
+            <a:endParaRPr lang="zh-CN" altLang="en-US" sz="2400" dirty="0" smtClean="0">
+              <a:latin typeface="HelveticaNeueLT Pro 55 Roman" pitchFamily="34" charset="0"/>
+            </a:endParaRPr>
+          </a:p>
+        </p:txBody>
+      </p:sp>
+      <p:sp>
+        <p:nvSpPr>
+          <p:cNvPr id="20" name="圆角矩形 19"/>
+          <p:cNvSpPr/>
+          <p:nvPr/>
+        </p:nvSpPr>
+        <p:spPr bwMode="invGray">
+          <a:xfrm>
+            <a:off x="4997790" y="4018317"/>
+            <a:ext cx="2031224" cy="576872"/>
+          </a:xfrm>
+          <a:prstGeom prst="roundRect">
+            <a:avLst/>
+          </a:prstGeom>
+          <a:ln>
+            <a:tailEnd type="none"/>
+          </a:ln>
+        </p:spPr>
+        <p:style>
+          <a:lnRef idx="2">
+            <a:schemeClr val="dk1"/>
+          </a:lnRef>
+          <a:fillRef idx="1">
+            <a:schemeClr val="lt1"/>
+          </a:fillRef>
+          <a:effectRef idx="0">
+            <a:schemeClr val="dk1"/>
+          </a:effectRef>
+          <a:fontRef idx="minor">
+            <a:schemeClr val="dk1"/>
+          </a:fontRef>
+        </p:style>
+        <p:txBody>
+          <a:bodyPr rtlCol="0" anchor="ctr">
+            <a:normAutofit fontScale="47500" lnSpcReduction="20000"/>
+          </a:bodyPr>
+          <a:lstStyle/>
+          <a:p>
+            <a:pPr algn="ctr"/>
+            <a:r>
+              <a:rPr lang="en-US" altLang="zh-CN" sz="2400" dirty="0" err="1" smtClean="0">
+                <a:latin typeface="HelveticaNeueLT Pro 55 Roman" pitchFamily="34" charset="0"/>
+              </a:rPr>
+              <a:t>SyncService</a:t>
+            </a:r>
+            <a:r>
+              <a:rPr lang="en-US" altLang="zh-CN" sz="2400" dirty="0" smtClean="0">
+                <a:latin typeface="HelveticaNeueLT Pro 55 Roman" pitchFamily="34" charset="0"/>
+              </a:rPr>
+              <a:t>:</a:t>
+            </a:r>
+            <a:br>
+              <a:rPr lang="en-US" altLang="zh-CN" sz="2400" dirty="0" smtClean="0">
+                <a:latin typeface="HelveticaNeueLT Pro 55 Roman" pitchFamily="34" charset="0"/>
+              </a:rPr>
+            </a:br>
+            <a:r>
+              <a:rPr lang="en-US" altLang="zh-CN" sz="2400" dirty="0" smtClean="0">
+                <a:latin typeface="HelveticaNeueLT Pro 55 Roman" pitchFamily="34" charset="0"/>
+              </a:rPr>
+              <a:t>Send sync message to other server node.</a:t>
+            </a:r>
+            <a:endParaRPr lang="zh-CN" altLang="en-US" sz="2400" dirty="0" smtClean="0">
+              <a:latin typeface="HelveticaNeueLT Pro 55 Roman" pitchFamily="34" charset="0"/>
+            </a:endParaRPr>
+          </a:p>
+        </p:txBody>
+      </p:sp>
+      <p:cxnSp>
+        <p:nvCxnSpPr>
+          <p:cNvPr id="22" name="直接箭头连接符 21"/>
+          <p:cNvCxnSpPr>
+            <a:stCxn id="19" idx="1"/>
+            <a:endCxn id="5" idx="3"/>
+          </p:cNvCxnSpPr>
+          <p:nvPr/>
+        </p:nvCxnSpPr>
+        <p:spPr>
+          <a:xfrm flipH="1" flipV="1">
+            <a:off x="3517997" y="3137056"/>
+            <a:ext cx="1479793" cy="216267"/>
+          </a:xfrm>
+          <a:prstGeom prst="straightConnector1">
+            <a:avLst/>
+          </a:prstGeom>
+          <a:ln w="25400">
+            <a:solidFill>
+              <a:schemeClr val="tx2"/>
+            </a:solidFill>
+            <a:tailEnd type="triangle"/>
+          </a:ln>
+        </p:spPr>
+        <p:style>
+          <a:lnRef idx="1">
+            <a:schemeClr val="accent1"/>
+          </a:lnRef>
+          <a:fillRef idx="0">
+            <a:schemeClr val="accent1"/>
+          </a:fillRef>
+          <a:effectRef idx="0">
+            <a:schemeClr val="accent1"/>
+          </a:effectRef>
+          <a:fontRef idx="minor">
+            <a:schemeClr val="tx1"/>
+          </a:fontRef>
+        </p:style>
+      </p:cxnSp>
+      <p:cxnSp>
+        <p:nvCxnSpPr>
+          <p:cNvPr id="24" name="直接箭头连接符 23"/>
+          <p:cNvCxnSpPr>
+            <a:stCxn id="20" idx="1"/>
+            <a:endCxn id="6" idx="3"/>
+          </p:cNvCxnSpPr>
+          <p:nvPr/>
+        </p:nvCxnSpPr>
+        <p:spPr>
+          <a:xfrm flipH="1" flipV="1">
+            <a:off x="3517996" y="4121084"/>
+            <a:ext cx="1479794" cy="194511"/>
+          </a:xfrm>
+          <a:prstGeom prst="straightConnector1">
+            <a:avLst/>
+          </a:prstGeom>
+          <a:ln w="25400">
+            <a:solidFill>
+              <a:schemeClr val="tx2"/>
+            </a:solidFill>
+            <a:tailEnd type="triangle"/>
+          </a:ln>
+        </p:spPr>
+        <p:style>
+          <a:lnRef idx="1">
+            <a:schemeClr val="accent1"/>
+          </a:lnRef>
+          <a:fillRef idx="0">
+            <a:schemeClr val="accent1"/>
+          </a:fillRef>
+          <a:effectRef idx="0">
+            <a:schemeClr val="accent1"/>
+          </a:effectRef>
+          <a:fontRef idx="minor">
+            <a:schemeClr val="tx1"/>
+          </a:fontRef>
+        </p:style>
+      </p:cxnSp>
+      <p:sp>
+        <p:nvSpPr>
+          <p:cNvPr id="29" name="矩形 28"/>
+          <p:cNvSpPr/>
+          <p:nvPr/>
+        </p:nvSpPr>
+        <p:spPr bwMode="invGray">
+          <a:xfrm>
+            <a:off x="558410" y="1249960"/>
+            <a:ext cx="2959585" cy="388079"/>
+          </a:xfrm>
+          <a:prstGeom prst="rect">
+            <a:avLst/>
+          </a:prstGeom>
+          <a:solidFill>
+            <a:schemeClr val="accent1"/>
+          </a:solidFill>
+          <a:ln w="25400">
+            <a:solidFill>
+              <a:schemeClr val="accent1">
+                <a:lumMod val="50000"/>
+              </a:schemeClr>
+            </a:solidFill>
+            <a:tailEnd type="none"/>
+          </a:ln>
+          <a:effectLst>
+            <a:outerShdw blurRad="50800" dist="50800" dir="2700000" algn="tl" rotWithShape="0">
+              <a:prstClr val="black">
+                <a:alpha val="40000"/>
+              </a:prstClr>
+            </a:outerShdw>
+          </a:effectLst>
+          <a:scene3d>
+            <a:camera prst="perspectiveRelaxed" fov="0">
+              <a:rot lat="0" lon="0" rev="0"/>
+            </a:camera>
+            <a:lightRig rig="threePt" dir="t"/>
+          </a:scene3d>
+          <a:sp3d extrusionH="177800"/>
+        </p:spPr>
+        <p:style>
+          <a:lnRef idx="1">
+            <a:schemeClr val="accent1"/>
+          </a:lnRef>
+          <a:fillRef idx="0">
+            <a:schemeClr val="accent1"/>
+          </a:fillRef>
+          <a:effectRef idx="0">
+            <a:schemeClr val="accent1"/>
+          </a:effectRef>
+          <a:fontRef idx="minor">
+            <a:schemeClr val="tx1"/>
+          </a:fontRef>
+        </p:style>
+        <p:txBody>
+          <a:bodyPr rtlCol="0" anchor="ctr">
+            <a:normAutofit fontScale="92500" lnSpcReduction="20000"/>
+          </a:bodyPr>
+          <a:lstStyle/>
+          <a:p>
+            <a:pPr algn="ctr"/>
+            <a:r>
+              <a:rPr lang="en-US" altLang="zh-CN" sz="2400" dirty="0" err="1" smtClean="0">
+                <a:latin typeface="HelveticaNeueLT Pro 55 Roman" pitchFamily="34" charset="0"/>
+              </a:rPr>
+              <a:t>LogService</a:t>
+            </a:r>
+            <a:endParaRPr lang="zh-CN" altLang="en-US" sz="2400" dirty="0" smtClean="0">
+              <a:latin typeface="HelveticaNeueLT Pro 55 Roman" pitchFamily="34" charset="0"/>
+            </a:endParaRPr>
+          </a:p>
+        </p:txBody>
+      </p:sp>
+      <p:cxnSp>
+        <p:nvCxnSpPr>
+          <p:cNvPr id="31" name="直接箭头连接符 30"/>
+          <p:cNvCxnSpPr>
+            <a:stCxn id="29" idx="2"/>
+            <a:endCxn id="4" idx="0"/>
+          </p:cNvCxnSpPr>
+          <p:nvPr/>
+        </p:nvCxnSpPr>
+        <p:spPr>
+          <a:xfrm>
+            <a:off x="2038203" y="1638039"/>
+            <a:ext cx="2" cy="433698"/>
+          </a:xfrm>
+          <a:prstGeom prst="straightConnector1">
+            <a:avLst/>
+          </a:prstGeom>
+          <a:ln w="25400">
+            <a:solidFill>
+              <a:schemeClr val="tx2"/>
+            </a:solidFill>
+            <a:tailEnd type="triangle"/>
+          </a:ln>
+        </p:spPr>
+        <p:style>
+          <a:lnRef idx="1">
+            <a:schemeClr val="accent1"/>
+          </a:lnRef>
+          <a:fillRef idx="0">
+            <a:schemeClr val="accent1"/>
+          </a:fillRef>
+          <a:effectRef idx="0">
+            <a:schemeClr val="accent1"/>
+          </a:effectRef>
+          <a:fontRef idx="minor">
+            <a:schemeClr val="tx1"/>
+          </a:fontRef>
+        </p:style>
+      </p:cxnSp>
+      <p:sp>
+        <p:nvSpPr>
+          <p:cNvPr id="33" name="圆角矩形 32"/>
+          <p:cNvSpPr/>
+          <p:nvPr/>
+        </p:nvSpPr>
+        <p:spPr bwMode="invGray">
+          <a:xfrm>
+            <a:off x="4997786" y="1167410"/>
+            <a:ext cx="1854186" cy="572838"/>
+          </a:xfrm>
+          <a:prstGeom prst="roundRect">
+            <a:avLst/>
+          </a:prstGeom>
+          <a:ln>
+            <a:tailEnd type="none"/>
+          </a:ln>
+        </p:spPr>
+        <p:style>
+          <a:lnRef idx="2">
+            <a:schemeClr val="dk1"/>
+          </a:lnRef>
+          <a:fillRef idx="1">
+            <a:schemeClr val="lt1"/>
+          </a:fillRef>
+          <a:effectRef idx="0">
+            <a:schemeClr val="dk1"/>
+          </a:effectRef>
+          <a:fontRef idx="minor">
+            <a:schemeClr val="dk1"/>
+          </a:fontRef>
+        </p:style>
+        <p:txBody>
+          <a:bodyPr rtlCol="0" anchor="ctr">
+            <a:normAutofit fontScale="47500" lnSpcReduction="20000"/>
+          </a:bodyPr>
+          <a:lstStyle/>
+          <a:p>
+            <a:pPr algn="ctr"/>
+            <a:r>
+              <a:rPr lang="en-US" altLang="zh-CN" sz="2400" dirty="0" err="1" smtClean="0">
+                <a:latin typeface="HelveticaNeueLT Pro 55 Roman" pitchFamily="34" charset="0"/>
+              </a:rPr>
+              <a:t>LogService</a:t>
+            </a:r>
+            <a:r>
+              <a:rPr lang="en-US" altLang="zh-CN" sz="2400" dirty="0" smtClean="0">
+                <a:latin typeface="HelveticaNeueLT Pro 55 Roman" pitchFamily="34" charset="0"/>
+              </a:rPr>
+              <a:t> :</a:t>
+            </a:r>
+            <a:br>
+              <a:rPr lang="en-US" altLang="zh-CN" sz="2400" dirty="0" smtClean="0">
+                <a:latin typeface="HelveticaNeueLT Pro 55 Roman" pitchFamily="34" charset="0"/>
+              </a:rPr>
+            </a:br>
+            <a:r>
+              <a:rPr lang="en-US" altLang="zh-CN" sz="2400" dirty="0" smtClean="0">
+                <a:latin typeface="HelveticaNeueLT Pro 55 Roman" pitchFamily="34" charset="0"/>
+              </a:rPr>
+              <a:t>Do not handle any data, just record data.</a:t>
+            </a:r>
+            <a:endParaRPr lang="zh-CN" altLang="en-US" sz="2400" dirty="0" smtClean="0">
+              <a:latin typeface="HelveticaNeueLT Pro 55 Roman" pitchFamily="34" charset="0"/>
+            </a:endParaRPr>
+          </a:p>
+        </p:txBody>
+      </p:sp>
+      <p:cxnSp>
+        <p:nvCxnSpPr>
+          <p:cNvPr id="35" name="直接箭头连接符 34"/>
+          <p:cNvCxnSpPr>
+            <a:stCxn id="33" idx="1"/>
+            <a:endCxn id="29" idx="3"/>
+          </p:cNvCxnSpPr>
+          <p:nvPr/>
+        </p:nvCxnSpPr>
+        <p:spPr>
+          <a:xfrm flipH="1" flipV="1">
+            <a:off x="3517995" y="1444000"/>
+            <a:ext cx="1479791" cy="9829"/>
+          </a:xfrm>
+          <a:prstGeom prst="straightConnector1">
+            <a:avLst/>
+          </a:prstGeom>
+          <a:ln w="25400">
+            <a:solidFill>
+              <a:schemeClr val="tx2"/>
+            </a:solidFill>
+            <a:tailEnd type="triangle"/>
+          </a:ln>
+        </p:spPr>
+        <p:style>
+          <a:lnRef idx="1">
+            <a:schemeClr val="accent1"/>
+          </a:lnRef>
+          <a:fillRef idx="0">
+            <a:schemeClr val="accent1"/>
+          </a:fillRef>
+          <a:effectRef idx="0">
+            <a:schemeClr val="accent1"/>
+          </a:effectRef>
+          <a:fontRef idx="minor">
+            <a:schemeClr val="tx1"/>
+          </a:fontRef>
+        </p:style>
+      </p:cxnSp>
+    </p:spTree>
+    <p:extLst>
+      <p:ext uri="{BB962C8B-B14F-4D97-AF65-F5344CB8AC3E}">
+        <p14:creationId xmlns:p14="http://schemas.microsoft.com/office/powerpoint/2010/main" val="1576115570"/>
+      </p:ext>
+    </p:extLst>
   </p:cSld>
   <p:clrMapOvr>
     <a:masterClrMapping/>
@@ -3798,8 +4721,24 @@
           <a:p>
             <a:r>
               <a:rPr lang="en-US" dirty="0" smtClean="0"/>
-              <a:t>Initialize draft by Jiang, Zhen</a:t>
-            </a:r>
+              <a:t>Initialize draft by Jiang, </a:t>
+            </a:r>
+            <a:r>
+              <a:rPr lang="en-US" dirty="0" smtClean="0"/>
+              <a:t>Zhen</a:t>
+            </a:r>
+          </a:p>
+          <a:p>
+            <a:r>
+              <a:rPr lang="en-US" dirty="0" smtClean="0"/>
+              <a:t>V2 update class diagram </a:t>
+            </a:r>
+            <a:r>
+              <a:rPr lang="en-US" altLang="zh-CN" dirty="0"/>
+              <a:t>by Jiang, Zhen</a:t>
+            </a:r>
+          </a:p>
+          <a:p>
             <a:endParaRPr lang="en-US" dirty="0"/>
           </a:p>
         </p:txBody>
@@ -4998,7 +5937,7 @@
   </a:extraClrSchemeLst>
   <a:extLst>
     <a:ext uri="{05A4C25C-085E-4340-85A3-A5531E510DB2}">
-      <thm15:themeFamily xmlns:thm15="http://schemas.microsoft.com/office/thememl/2012/main" xmlns="" name="Sony_2014.3.16-9 - Copy" id="{B676A8F2-F3BF-434D-9A27-5D56A866542E}" vid="{8FB125D9-A16B-4F39-87FC-EE9A98C14CFE}"/>
+      <thm15:themeFamily xmlns:thm15="http://schemas.microsoft.com/office/thememl/2012/main" name="Sony_2014.3.16-9 - Copy" id="{B676A8F2-F3BF-434D-9A27-5D56A866542E}" vid="{8FB125D9-A16B-4F39-87FC-EE9A98C14CFE}"/>
     </a:ext>
   </a:extLst>
 </a:theme>

</xml_diff>